<commit_message>
mer.  6 janv. 2021 18:28:10
</commit_message>
<xml_diff>
--- a/Les tutoriels de la FFBA_page1.pptx
+++ b/Les tutoriels de la FFBA_page1.pptx
@@ -301,7 +301,7 @@
             <a:fld id="{77F9EBB9-3DB1-464B-8411-81488C3DC3B8}" type="datetimeFigureOut">
               <a:rPr lang="fr-FR" smtClean="0"/>
               <a:pPr/>
-              <a:t>23/11/2020</a:t>
+              <a:t>06/01/2021</a:t>
             </a:fld>
             <a:endParaRPr lang="fr-FR"/>
           </a:p>
@@ -468,7 +468,7 @@
             <a:fld id="{77F9EBB9-3DB1-464B-8411-81488C3DC3B8}" type="datetimeFigureOut">
               <a:rPr lang="fr-FR" smtClean="0"/>
               <a:pPr/>
-              <a:t>23/11/2020</a:t>
+              <a:t>06/01/2021</a:t>
             </a:fld>
             <a:endParaRPr lang="fr-FR"/>
           </a:p>
@@ -645,7 +645,7 @@
             <a:fld id="{77F9EBB9-3DB1-464B-8411-81488C3DC3B8}" type="datetimeFigureOut">
               <a:rPr lang="fr-FR" smtClean="0"/>
               <a:pPr/>
-              <a:t>23/11/2020</a:t>
+              <a:t>06/01/2021</a:t>
             </a:fld>
             <a:endParaRPr lang="fr-FR"/>
           </a:p>
@@ -812,7 +812,7 @@
             <a:fld id="{77F9EBB9-3DB1-464B-8411-81488C3DC3B8}" type="datetimeFigureOut">
               <a:rPr lang="fr-FR" smtClean="0"/>
               <a:pPr/>
-              <a:t>23/11/2020</a:t>
+              <a:t>06/01/2021</a:t>
             </a:fld>
             <a:endParaRPr lang="fr-FR"/>
           </a:p>
@@ -1055,7 +1055,7 @@
             <a:fld id="{77F9EBB9-3DB1-464B-8411-81488C3DC3B8}" type="datetimeFigureOut">
               <a:rPr lang="fr-FR" smtClean="0"/>
               <a:pPr/>
-              <a:t>23/11/2020</a:t>
+              <a:t>06/01/2021</a:t>
             </a:fld>
             <a:endParaRPr lang="fr-FR"/>
           </a:p>
@@ -1340,7 +1340,7 @@
             <a:fld id="{77F9EBB9-3DB1-464B-8411-81488C3DC3B8}" type="datetimeFigureOut">
               <a:rPr lang="fr-FR" smtClean="0"/>
               <a:pPr/>
-              <a:t>23/11/2020</a:t>
+              <a:t>06/01/2021</a:t>
             </a:fld>
             <a:endParaRPr lang="fr-FR"/>
           </a:p>
@@ -1759,7 +1759,7 @@
             <a:fld id="{77F9EBB9-3DB1-464B-8411-81488C3DC3B8}" type="datetimeFigureOut">
               <a:rPr lang="fr-FR" smtClean="0"/>
               <a:pPr/>
-              <a:t>23/11/2020</a:t>
+              <a:t>06/01/2021</a:t>
             </a:fld>
             <a:endParaRPr lang="fr-FR"/>
           </a:p>
@@ -1874,7 +1874,7 @@
             <a:fld id="{77F9EBB9-3DB1-464B-8411-81488C3DC3B8}" type="datetimeFigureOut">
               <a:rPr lang="fr-FR" smtClean="0"/>
               <a:pPr/>
-              <a:t>23/11/2020</a:t>
+              <a:t>06/01/2021</a:t>
             </a:fld>
             <a:endParaRPr lang="fr-FR"/>
           </a:p>
@@ -1966,7 +1966,7 @@
             <a:fld id="{77F9EBB9-3DB1-464B-8411-81488C3DC3B8}" type="datetimeFigureOut">
               <a:rPr lang="fr-FR" smtClean="0"/>
               <a:pPr/>
-              <a:t>23/11/2020</a:t>
+              <a:t>06/01/2021</a:t>
             </a:fld>
             <a:endParaRPr lang="fr-FR"/>
           </a:p>
@@ -2240,7 +2240,7 @@
             <a:fld id="{77F9EBB9-3DB1-464B-8411-81488C3DC3B8}" type="datetimeFigureOut">
               <a:rPr lang="fr-FR" smtClean="0"/>
               <a:pPr/>
-              <a:t>23/11/2020</a:t>
+              <a:t>06/01/2021</a:t>
             </a:fld>
             <a:endParaRPr lang="fr-FR"/>
           </a:p>
@@ -2490,7 +2490,7 @@
             <a:fld id="{77F9EBB9-3DB1-464B-8411-81488C3DC3B8}" type="datetimeFigureOut">
               <a:rPr lang="fr-FR" smtClean="0"/>
               <a:pPr/>
-              <a:t>23/11/2020</a:t>
+              <a:t>06/01/2021</a:t>
             </a:fld>
             <a:endParaRPr lang="fr-FR"/>
           </a:p>
@@ -2715,7 +2715,7 @@
             <a:fld id="{77F9EBB9-3DB1-464B-8411-81488C3DC3B8}" type="datetimeFigureOut">
               <a:rPr lang="fr-FR" smtClean="0"/>
               <a:pPr/>
-              <a:t>23/11/2020</a:t>
+              <a:t>06/01/2021</a:t>
             </a:fld>
             <a:endParaRPr lang="fr-FR"/>
           </a:p>
@@ -3406,15 +3406,7 @@
                   <a:srgbClr val="FF7F00"/>
                 </a:solidFill>
               </a:rPr>
-              <a:t>Deuxième </a:t>
-            </a:r>
-            <a:r>
-              <a:rPr lang="fr-FR" sz="4400" b="1" u="sng" dirty="0" smtClean="0">
-                <a:solidFill>
-                  <a:srgbClr val="FF7F00"/>
-                </a:solidFill>
-              </a:rPr>
-              <a:t>partie</a:t>
+              <a:t>Deuxième partie</a:t>
             </a:r>
           </a:p>
           <a:p>
@@ -3435,11 +3427,6 @@
               </a:rPr>
               <a:t>Autres imports déjà paramétrés</a:t>
             </a:r>
-            <a:endParaRPr lang="fr-FR" sz="4000" dirty="0" smtClean="0">
-              <a:solidFill>
-                <a:srgbClr val="FF7F00"/>
-              </a:solidFill>
-            </a:endParaRPr>
           </a:p>
           <a:p>
             <a:endParaRPr lang="fr-FR" dirty="0" smtClean="0"/>
@@ -8468,7 +8455,11 @@
             </a:pPr>
             <a:r>
               <a:rPr lang="fr-FR" sz="2000" b="1" dirty="0" smtClean="0"/>
-              <a:t>ffba.formation-informatique@banquealimentaire.org</a:t>
+              <a:t>            support-formation@banquealimentaire.org</a:t>
+            </a:r>
+            <a:r>
+              <a:rPr lang="fr-FR" sz="2000" b="1" dirty="0" smtClean="0"/>
+              <a:t/>
             </a:r>
             <a:br>
               <a:rPr lang="fr-FR" sz="2000" b="1" dirty="0" smtClean="0"/>
@@ -8884,8 +8875,8 @@
               <a:t>Import d’une réception ‘</a:t>
             </a:r>
             <a:r>
-              <a:rPr lang="fr-FR" b="1" dirty="0" err="1" smtClean="0"/>
-              <a:t>ramassse</a:t>
+              <a:rPr lang="fr-FR" b="1" dirty="0" smtClean="0"/>
+              <a:t>ramasse</a:t>
             </a:r>
             <a:r>
               <a:rPr lang="fr-FR" b="1" dirty="0" smtClean="0"/>
@@ -8918,8 +8909,8 @@
               <a:t>1.2 mise en œuvre sous </a:t>
             </a:r>
             <a:r>
-              <a:rPr lang="fr-FR" dirty="0" err="1" smtClean="0"/>
-              <a:t>excel</a:t>
+              <a:rPr lang="fr-FR" dirty="0" smtClean="0"/>
+              <a:t>Excel</a:t>
             </a:r>
             <a:endParaRPr lang="fr-FR" dirty="0" smtClean="0"/>
           </a:p>
@@ -8941,12 +8932,12 @@
               <a:t>1.4 Examen des </a:t>
             </a:r>
             <a:r>
-              <a:rPr lang="fr-FR" dirty="0" err="1" smtClean="0"/>
-              <a:t>compte-rendus</a:t>
-            </a:r>
-            <a:r>
               <a:rPr lang="fr-FR" dirty="0" smtClean="0"/>
-              <a:t> de bonne exécution</a:t>
+              <a:t>compte-rendu </a:t>
+            </a:r>
+            <a:r>
+              <a:rPr lang="fr-FR" dirty="0" smtClean="0"/>
+              <a:t>de bonne exécution</a:t>
             </a:r>
           </a:p>
           <a:p>
@@ -8990,13 +8981,8 @@
             </a:pPr>
             <a:r>
               <a:rPr lang="fr-FR" dirty="0" smtClean="0"/>
-              <a:t>2.1  </a:t>
-            </a:r>
-            <a:r>
-              <a:rPr lang="fr-FR" dirty="0" smtClean="0"/>
-              <a:t>Réception de produits UE</a:t>
-            </a:r>
-            <a:endParaRPr lang="fr-FR" dirty="0" smtClean="0"/>
+              <a:t>2.1  Réception de produits UE</a:t>
+            </a:r>
           </a:p>
           <a:p>
             <a:pPr>
@@ -9006,7 +8992,6 @@
               <a:rPr lang="fr-FR" dirty="0" smtClean="0"/>
               <a:t>2.2  Réception de la Collecte</a:t>
             </a:r>
-            <a:endParaRPr lang="fr-FR" dirty="0" smtClean="0"/>
           </a:p>
           <a:p>
             <a:pPr>
@@ -9014,11 +8999,7 @@
             </a:pPr>
             <a:r>
               <a:rPr lang="fr-FR" dirty="0" smtClean="0"/>
-              <a:t>2.3  </a:t>
-            </a:r>
-            <a:r>
-              <a:rPr lang="fr-FR" dirty="0" smtClean="0"/>
-              <a:t>Import de commandes fournisseurs</a:t>
+              <a:t>2.3  Import de commandes fournisseurs</a:t>
             </a:r>
           </a:p>
           <a:p>
@@ -9371,11 +9352,6 @@
               </a:rPr>
               <a:t>Autres imports déjà paramétrés</a:t>
             </a:r>
-            <a:endParaRPr lang="fr-FR" sz="4000" dirty="0" smtClean="0">
-              <a:solidFill>
-                <a:srgbClr val="FF7F00"/>
-              </a:solidFill>
-            </a:endParaRPr>
           </a:p>
           <a:p>
             <a:endParaRPr lang="fr-FR" dirty="0" smtClean="0"/>

</xml_diff>